<commit_message>
added presentation task 12
</commit_message>
<xml_diff>
--- a/doc/task12/Präsentation_Diagrams.pptx
+++ b/doc/task12/Präsentation_Diagrams.pptx
@@ -9,6 +9,9 @@
     <p:sldId id="257" r:id="rId3"/>
     <p:sldId id="258" r:id="rId4"/>
     <p:sldId id="259" r:id="rId5"/>
+    <p:sldId id="261" r:id="rId6"/>
+    <p:sldId id="262" r:id="rId7"/>
+    <p:sldId id="260" r:id="rId8"/>
   </p:sldIdLst>
   <p:sldSz cx="12192000" cy="6858000"/>
   <p:notesSz cx="6858000" cy="9144000"/>
@@ -12376,7 +12379,7 @@
             </a:r>
             <a:r>
               <a:rPr lang="en-US" dirty="0" smtClean="0"/>
-              <a:t>12: Class diagram</a:t>
+              <a:t>12 / 13: Class diagram &amp; State pattern</a:t>
             </a:r>
             <a:endParaRPr lang="en-US" dirty="0"/>
           </a:p>
@@ -12703,6 +12706,253 @@
       </p:par>
     </p:tnLst>
   </p:timing>
+</p:sld>
+</file>
+
+<file path=ppt/slides/slide5.xml><?xml version="1.0" encoding="utf-8"?>
+<p:sld xmlns:a="http://schemas.openxmlformats.org/drawingml/2006/main" xmlns:r="http://schemas.openxmlformats.org/officeDocument/2006/relationships" xmlns:p="http://schemas.openxmlformats.org/presentationml/2006/main">
+  <p:cSld>
+    <p:spTree>
+      <p:nvGrpSpPr>
+        <p:cNvPr id="1" name=""/>
+        <p:cNvGrpSpPr/>
+        <p:nvPr/>
+      </p:nvGrpSpPr>
+      <p:grpSpPr>
+        <a:xfrm>
+          <a:off x="0" y="0"/>
+          <a:ext cx="0" cy="0"/>
+          <a:chOff x="0" y="0"/>
+          <a:chExt cx="0" cy="0"/>
+        </a:xfrm>
+      </p:grpSpPr>
+      <p:sp>
+        <p:nvSpPr>
+          <p:cNvPr id="2" name="Title 1"/>
+          <p:cNvSpPr>
+            <a:spLocks noGrp="1"/>
+          </p:cNvSpPr>
+          <p:nvPr>
+            <p:ph type="title"/>
+          </p:nvPr>
+        </p:nvSpPr>
+        <p:spPr>
+          <a:xfrm>
+            <a:off x="1388097" y="0"/>
+            <a:ext cx="9495177" cy="1075420"/>
+          </a:xfrm>
+        </p:spPr>
+        <p:txBody>
+          <a:bodyPr>
+            <a:normAutofit/>
+          </a:bodyPr>
+          <a:lstStyle/>
+          <a:p>
+            <a:pPr algn="ctr"/>
+            <a:r>
+              <a:rPr lang="en-US" dirty="0" smtClean="0"/>
+              <a:t>State Pattern</a:t>
+            </a:r>
+            <a:endParaRPr lang="en-US" dirty="0"/>
+          </a:p>
+        </p:txBody>
+      </p:sp>
+      <p:pic>
+        <p:nvPicPr>
+          <p:cNvPr id="5" name="Bild 4"/>
+          <p:cNvPicPr>
+            <a:picLocks noChangeAspect="1"/>
+          </p:cNvPicPr>
+          <p:nvPr/>
+        </p:nvPicPr>
+        <p:blipFill>
+          <a:blip r:embed="rId2"/>
+          <a:stretch>
+            <a:fillRect/>
+          </a:stretch>
+        </p:blipFill>
+        <p:spPr>
+          <a:xfrm>
+            <a:off x="896017" y="871326"/>
+            <a:ext cx="10380428" cy="5838991"/>
+          </a:xfrm>
+          <a:prstGeom prst="rect">
+            <a:avLst/>
+          </a:prstGeom>
+        </p:spPr>
+      </p:pic>
+    </p:spTree>
+    <p:extLst>
+      <p:ext uri="{BB962C8B-B14F-4D97-AF65-F5344CB8AC3E}">
+        <p14:creationId xmlns:p14="http://schemas.microsoft.com/office/powerpoint/2010/main" val="1979182330"/>
+      </p:ext>
+    </p:extLst>
+  </p:cSld>
+  <p:clrMapOvr>
+    <a:masterClrMapping/>
+  </p:clrMapOvr>
+  <p:timing>
+    <p:tnLst>
+      <p:par>
+        <p:cTn xmlns:p14="http://schemas.microsoft.com/office/powerpoint/2010/main" id="1" dur="indefinite" restart="never" nodeType="tmRoot"/>
+      </p:par>
+    </p:tnLst>
+  </p:timing>
+</p:sld>
+</file>
+
+<file path=ppt/slides/slide6.xml><?xml version="1.0" encoding="utf-8"?>
+<p:sld xmlns:a="http://schemas.openxmlformats.org/drawingml/2006/main" xmlns:r="http://schemas.openxmlformats.org/officeDocument/2006/relationships" xmlns:p="http://schemas.openxmlformats.org/presentationml/2006/main">
+  <p:cSld>
+    <p:spTree>
+      <p:nvGrpSpPr>
+        <p:cNvPr id="1" name=""/>
+        <p:cNvGrpSpPr/>
+        <p:nvPr/>
+      </p:nvGrpSpPr>
+      <p:grpSpPr>
+        <a:xfrm>
+          <a:off x="0" y="0"/>
+          <a:ext cx="0" cy="0"/>
+          <a:chOff x="0" y="0"/>
+          <a:chExt cx="0" cy="0"/>
+        </a:xfrm>
+      </p:grpSpPr>
+      <p:sp>
+        <p:nvSpPr>
+          <p:cNvPr id="2" name="Title 1"/>
+          <p:cNvSpPr>
+            <a:spLocks noGrp="1"/>
+          </p:cNvSpPr>
+          <p:nvPr>
+            <p:ph type="title"/>
+          </p:nvPr>
+        </p:nvSpPr>
+        <p:spPr>
+          <a:xfrm>
+            <a:off x="44300" y="2634069"/>
+            <a:ext cx="2746661" cy="1075420"/>
+          </a:xfrm>
+        </p:spPr>
+        <p:txBody>
+          <a:bodyPr>
+            <a:normAutofit fontScale="90000"/>
+          </a:bodyPr>
+          <a:lstStyle/>
+          <a:p>
+            <a:pPr algn="ctr"/>
+            <a:r>
+              <a:rPr lang="en-US" dirty="0" smtClean="0"/>
+              <a:t>State Pattern</a:t>
+            </a:r>
+            <a:endParaRPr lang="en-US" dirty="0"/>
+          </a:p>
+        </p:txBody>
+      </p:sp>
+      <p:pic>
+        <p:nvPicPr>
+          <p:cNvPr id="3" name="Bild 2"/>
+          <p:cNvPicPr>
+            <a:picLocks noChangeAspect="1"/>
+          </p:cNvPicPr>
+          <p:nvPr/>
+        </p:nvPicPr>
+        <p:blipFill>
+          <a:blip r:embed="rId2"/>
+          <a:stretch>
+            <a:fillRect/>
+          </a:stretch>
+        </p:blipFill>
+        <p:spPr>
+          <a:xfrm>
+            <a:off x="3106472" y="1362155"/>
+            <a:ext cx="6438900" cy="4102100"/>
+          </a:xfrm>
+          <a:prstGeom prst="rect">
+            <a:avLst/>
+          </a:prstGeom>
+        </p:spPr>
+      </p:pic>
+    </p:spTree>
+    <p:extLst>
+      <p:ext uri="{BB962C8B-B14F-4D97-AF65-F5344CB8AC3E}">
+        <p14:creationId xmlns:p14="http://schemas.microsoft.com/office/powerpoint/2010/main" val="1676692478"/>
+      </p:ext>
+    </p:extLst>
+  </p:cSld>
+  <p:clrMapOvr>
+    <a:masterClrMapping/>
+  </p:clrMapOvr>
+  <p:timing>
+    <p:tnLst>
+      <p:par>
+        <p:cTn xmlns:p14="http://schemas.microsoft.com/office/powerpoint/2010/main" id="1" dur="indefinite" restart="never" nodeType="tmRoot"/>
+      </p:par>
+    </p:tnLst>
+  </p:timing>
+</p:sld>
+</file>
+
+<file path=ppt/slides/slide7.xml><?xml version="1.0" encoding="utf-8"?>
+<p:sld xmlns:a="http://schemas.openxmlformats.org/drawingml/2006/main" xmlns:r="http://schemas.openxmlformats.org/officeDocument/2006/relationships" xmlns:p="http://schemas.openxmlformats.org/presentationml/2006/main">
+  <p:cSld>
+    <p:spTree>
+      <p:nvGrpSpPr>
+        <p:cNvPr id="1" name=""/>
+        <p:cNvGrpSpPr/>
+        <p:nvPr/>
+      </p:nvGrpSpPr>
+      <p:grpSpPr>
+        <a:xfrm>
+          <a:off x="0" y="0"/>
+          <a:ext cx="0" cy="0"/>
+          <a:chOff x="0" y="0"/>
+          <a:chExt cx="0" cy="0"/>
+        </a:xfrm>
+      </p:grpSpPr>
+      <p:sp>
+        <p:nvSpPr>
+          <p:cNvPr id="2" name="Titel 1"/>
+          <p:cNvSpPr>
+            <a:spLocks noGrp="1"/>
+          </p:cNvSpPr>
+          <p:nvPr>
+            <p:ph type="title"/>
+          </p:nvPr>
+        </p:nvSpPr>
+        <p:spPr>
+          <a:xfrm>
+            <a:off x="0" y="618517"/>
+            <a:ext cx="12191999" cy="3989173"/>
+          </a:xfrm>
+        </p:spPr>
+        <p:txBody>
+          <a:bodyPr/>
+          <a:lstStyle/>
+          <a:p>
+            <a:pPr algn="ctr"/>
+            <a:r>
+              <a:rPr lang="de-DE" dirty="0" err="1" smtClean="0"/>
+              <a:t>Questions</a:t>
+            </a:r>
+            <a:r>
+              <a:rPr lang="de-DE" dirty="0" smtClean="0"/>
+              <a:t> ?</a:t>
+            </a:r>
+            <a:endParaRPr lang="de-DE" dirty="0"/>
+          </a:p>
+        </p:txBody>
+      </p:sp>
+    </p:spTree>
+    <p:extLst>
+      <p:ext uri="{BB962C8B-B14F-4D97-AF65-F5344CB8AC3E}">
+        <p14:creationId xmlns:p14="http://schemas.microsoft.com/office/powerpoint/2010/main" val="3095737066"/>
+      </p:ext>
+    </p:extLst>
+  </p:cSld>
+  <p:clrMapOvr>
+    <a:masterClrMapping/>
+  </p:clrMapOvr>
 </p:sld>
 </file>
 

</xml_diff>